<commit_message>
new modification in XStudio presentation
</commit_message>
<xml_diff>
--- a/XStudio Test management tool.pptx
+++ b/XStudio Test management tool.pptx
@@ -7278,8 +7278,8 @@
         </p:nvSpPr>
         <p:spPr>
           <a:xfrm>
-            <a:off x="591671" y="1115776"/>
-            <a:ext cx="8283388" cy="5632311"/>
+            <a:off x="443754" y="2648741"/>
+            <a:ext cx="8283388" cy="3785652"/>
           </a:xfrm>
           <a:prstGeom prst="rect">
             <a:avLst/>
@@ -7299,20 +7299,20 @@
               <a:buChar char="Ø"/>
             </a:pPr>
             <a:r>
-              <a:rPr lang="en-GB" sz="2000" dirty="0" smtClean="0"/>
-              <a:t> </a:t>
-            </a:r>
-            <a:r>
-              <a:rPr lang="en-GB" sz="2000" dirty="0" smtClean="0"/>
-              <a:t> </a:t>
-            </a:r>
-            <a:r>
               <a:rPr lang="en-GB" sz="2000" b="1" dirty="0" smtClean="0"/>
-              <a:t>100</a:t>
+              <a:t>  Web </a:t>
             </a:r>
             <a:r>
               <a:rPr lang="en-GB" sz="2000" b="1" dirty="0" smtClean="0"/>
-              <a:t>% graphical (and tree-based for flexibility)</a:t>
+              <a:t>access (through Java </a:t>
+            </a:r>
+            <a:r>
+              <a:rPr lang="en-GB" sz="2000" b="1" dirty="0" err="1" smtClean="0"/>
+              <a:t>WebStart</a:t>
+            </a:r>
+            <a:r>
+              <a:rPr lang="en-GB" sz="2000" b="1" dirty="0" smtClean="0"/>
+              <a:t>)</a:t>
             </a:r>
           </a:p>
           <a:p>
@@ -7325,19 +7325,11 @@
             </a:pPr>
             <a:r>
               <a:rPr lang="en-GB" sz="2000" b="1" dirty="0" smtClean="0"/>
-              <a:t>  Web </a:t>
+              <a:t>Document </a:t>
             </a:r>
             <a:r>
               <a:rPr lang="en-GB" sz="2000" b="1" dirty="0" smtClean="0"/>
-              <a:t>access (through Java </a:t>
-            </a:r>
-            <a:r>
-              <a:rPr lang="en-GB" sz="2000" b="1" dirty="0" err="1" smtClean="0"/>
-              <a:t>WebStart</a:t>
-            </a:r>
-            <a:r>
-              <a:rPr lang="en-GB" sz="2000" b="1" dirty="0" smtClean="0"/>
-              <a:t>)</a:t>
+              <a:t>sharing (including versioning and locking capabilities)</a:t>
             </a:r>
           </a:p>
           <a:p>
@@ -7350,11 +7342,23 @@
             </a:pPr>
             <a:r>
               <a:rPr lang="en-GB" sz="2000" b="1" dirty="0" smtClean="0"/>
-              <a:t> Integrated </a:t>
+              <a:t>Customization </a:t>
             </a:r>
             <a:r>
               <a:rPr lang="en-GB" sz="2000" b="1" dirty="0" smtClean="0"/>
-              <a:t>management of ALL actors involved in the QA/testing project: users, systems under test, requirements, specifications, projects tests, basic test procedures, structured test procedures, test campaigns, test reports, defects</a:t>
+              <a:t>of all generated documents (</a:t>
+            </a:r>
+            <a:r>
+              <a:rPr lang="en-GB" sz="2000" b="1" dirty="0" err="1" smtClean="0"/>
+              <a:t>testplans</a:t>
+            </a:r>
+            <a:r>
+              <a:rPr lang="en-GB" sz="2000" b="1" dirty="0" smtClean="0"/>
+              <a:t>, test reports etc</a:t>
+            </a:r>
+            <a:r>
+              <a:rPr lang="en-GB" sz="2000" b="1" dirty="0" smtClean="0"/>
+              <a:t>.)</a:t>
             </a:r>
           </a:p>
           <a:p>
@@ -7366,8 +7370,16 @@
               <a:buChar char="Ø"/>
             </a:pPr>
             <a:r>
+              <a:rPr lang="en-US" sz="2000" b="1" dirty="0" smtClean="0"/>
+              <a:t> </a:t>
+            </a:r>
+            <a:r>
               <a:rPr lang="en-GB" sz="2000" b="1" dirty="0" smtClean="0"/>
-              <a:t> Document sharing (including versioning and locking capabilities)</a:t>
+              <a:t>Attachments on requirements, specifications, tests, test cases, defects, </a:t>
+            </a:r>
+            <a:r>
+              <a:rPr lang="en-GB" sz="2000" b="1" dirty="0" smtClean="0"/>
+              <a:t>folders/container</a:t>
             </a:r>
           </a:p>
           <a:p>
@@ -7380,45 +7392,13 @@
             </a:pPr>
             <a:r>
               <a:rPr lang="en-GB" sz="2000" b="1" dirty="0" smtClean="0"/>
-              <a:t> User </a:t>
+              <a:t> User profile and teams customization (rights management</a:t>
             </a:r>
             <a:r>
               <a:rPr lang="en-GB" sz="2000" b="1" dirty="0" smtClean="0"/>
-              <a:t>profile and </a:t>
-            </a:r>
-            <a:r>
-              <a:rPr lang="en-GB" sz="2000" b="1" dirty="0" smtClean="0"/>
-              <a:t>teams </a:t>
-            </a:r>
-            <a:r>
-              <a:rPr lang="en-GB" sz="2000" b="1" dirty="0" smtClean="0"/>
-              <a:t>customization (rights management)</a:t>
-            </a:r>
-          </a:p>
-          <a:p>
-            <a:pPr>
-              <a:lnSpc>
-                <a:spcPct val="200000"/>
-              </a:lnSpc>
-              <a:buFont typeface="Wingdings" pitchFamily="2" charset="2"/>
-              <a:buChar char="Ø"/>
-            </a:pPr>
-            <a:r>
-              <a:rPr lang="en-GB" sz="2000" b="1" dirty="0" smtClean="0"/>
-              <a:t>Customization </a:t>
-            </a:r>
-            <a:r>
-              <a:rPr lang="en-GB" sz="2000" b="1" dirty="0" smtClean="0"/>
-              <a:t>of all generated documents (</a:t>
-            </a:r>
-            <a:r>
-              <a:rPr lang="en-GB" sz="2000" b="1" dirty="0" err="1" smtClean="0"/>
-              <a:t>testplans</a:t>
-            </a:r>
-            <a:r>
-              <a:rPr lang="en-GB" sz="2000" b="1" dirty="0" smtClean="0"/>
-              <a:t>, test reports etc.)</a:t>
-            </a:r>
+              <a:t>)</a:t>
+            </a:r>
+            <a:endParaRPr lang="en-GB" sz="2000" b="1" dirty="0" smtClean="0"/>
           </a:p>
         </p:txBody>
       </p:sp>
@@ -7439,8 +7419,8 @@
         </p:blipFill>
         <p:spPr bwMode="auto">
           <a:xfrm>
-            <a:off x="5955413" y="847165"/>
-            <a:ext cx="2907020" cy="1694329"/>
+            <a:off x="5484765" y="847165"/>
+            <a:ext cx="3137737" cy="1828800"/>
           </a:xfrm>
           <a:prstGeom prst="rect">
             <a:avLst/>
@@ -7501,8 +7481,8 @@
         </p:nvSpPr>
         <p:spPr>
           <a:xfrm>
-            <a:off x="497541" y="948689"/>
-            <a:ext cx="8350624" cy="5632311"/>
+            <a:off x="403411" y="2051349"/>
+            <a:ext cx="8350624" cy="4401205"/>
           </a:xfrm>
           <a:prstGeom prst="rect">
             <a:avLst/>
@@ -7581,7 +7561,11 @@
             </a:r>
             <a:r>
               <a:rPr lang="en-GB" sz="2000" b="1" dirty="0" smtClean="0"/>
-              <a:t>, Mantis)</a:t>
+              <a:t>, Mantis</a:t>
+            </a:r>
+            <a:r>
+              <a:rPr lang="en-GB" sz="2000" b="1" dirty="0" smtClean="0"/>
+              <a:t>)</a:t>
             </a:r>
           </a:p>
           <a:p>
@@ -7596,6 +7580,7 @@
               <a:rPr lang="en-GB" sz="2000" b="1" dirty="0" smtClean="0"/>
               <a:t>  Workflow on requirements, specifications, test authoring, test implementation status and defects</a:t>
             </a:r>
+            <a:endParaRPr lang="en-GB" sz="2000" b="1" dirty="0" smtClean="0"/>
           </a:p>
           <a:p>
             <a:pPr>
@@ -7607,26 +7592,17 @@
             </a:pPr>
             <a:r>
               <a:rPr lang="en-GB" sz="2000" b="1" dirty="0" smtClean="0"/>
-              <a:t> Versioning and locking mechanism on attachments</a:t>
-            </a:r>
-          </a:p>
-          <a:p>
-            <a:pPr>
-              <a:lnSpc>
-                <a:spcPct val="200000"/>
-              </a:lnSpc>
-              <a:buFont typeface="Wingdings" pitchFamily="2" charset="2"/>
-              <a:buChar char="Ø"/>
-            </a:pPr>
-            <a:r>
-              <a:rPr lang="en-US" sz="2000" b="1" dirty="0" smtClean="0"/>
-              <a:t>  </a:t>
+              <a:t> </a:t>
             </a:r>
             <a:r>
               <a:rPr lang="en-GB" sz="2000" b="1" dirty="0" smtClean="0"/>
-              <a:t>Attachments on requirements, specifications, tests, test cases, defects, folders/container</a:t>
-            </a:r>
-            <a:endParaRPr lang="en-GB" sz="2000" dirty="0"/>
+              <a:t>Versioning and locking mechanism on </a:t>
+            </a:r>
+            <a:r>
+              <a:rPr lang="en-GB" sz="2000" b="1" dirty="0" smtClean="0"/>
+              <a:t>attachments</a:t>
+            </a:r>
+            <a:endParaRPr lang="en-GB" sz="2000" b="1" dirty="0" smtClean="0"/>
           </a:p>
         </p:txBody>
       </p:sp>
@@ -7666,7 +7642,7 @@
       </p:sp>
       <p:pic>
         <p:nvPicPr>
-          <p:cNvPr id="87042" name="Picture 2" descr="http://www.xqual.com/documentation/user_guide/images/screenshots/slides_large/thumb_Requirement_Tree.gif"/>
+          <p:cNvPr id="7" name="Picture 4" descr="http://www.xqual.com/documentation/user_guide/images/screenshots/slides_large/thumb_Defect_Per-priority_Reports.gif"/>
           <p:cNvPicPr>
             <a:picLocks noChangeAspect="1" noChangeArrowheads="1"/>
           </p:cNvPicPr>
@@ -7681,8 +7657,8 @@
         </p:blipFill>
         <p:spPr bwMode="auto">
           <a:xfrm>
-            <a:off x="6556375" y="938212"/>
-            <a:ext cx="2494382" cy="1455364"/>
+            <a:off x="5822576" y="1126470"/>
+            <a:ext cx="2796989" cy="1634336"/>
           </a:xfrm>
           <a:prstGeom prst="rect">
             <a:avLst/>
@@ -7956,7 +7932,7 @@
       </p:sp>
       <p:pic>
         <p:nvPicPr>
-          <p:cNvPr id="86020" name="Picture 4" descr="http://www.xqual.com/documentation/user_guide/images/screenshots/slides_large/thumb_Defect_Per-priority_Reports.gif"/>
+          <p:cNvPr id="13" name="Picture 3"/>
           <p:cNvPicPr>
             <a:picLocks noChangeAspect="1" noChangeArrowheads="1"/>
           </p:cNvPicPr>
@@ -7964,32 +7940,6 @@
         </p:nvPicPr>
         <p:blipFill>
           <a:blip r:embed="rId2" cstate="print"/>
-          <a:srcRect/>
-          <a:stretch>
-            <a:fillRect/>
-          </a:stretch>
-        </p:blipFill>
-        <p:spPr bwMode="auto">
-          <a:xfrm>
-            <a:off x="6233646" y="1570223"/>
-            <a:ext cx="2439707" cy="1425569"/>
-          </a:xfrm>
-          <a:prstGeom prst="rect">
-            <a:avLst/>
-          </a:prstGeom>
-          <a:noFill/>
-        </p:spPr>
-      </p:pic>
-      <p:pic>
-        <p:nvPicPr>
-          <p:cNvPr id="13" name="Picture 3"/>
-          <p:cNvPicPr>
-            <a:picLocks noChangeAspect="1" noChangeArrowheads="1"/>
-          </p:cNvPicPr>
-          <p:nvPr/>
-        </p:nvPicPr>
-        <p:blipFill>
-          <a:blip r:embed="rId3" cstate="print"/>
           <a:srcRect/>
           <a:stretch>
             <a:fillRect/>
@@ -8024,7 +7974,7 @@
           <p:nvPr/>
         </p:nvPicPr>
         <p:blipFill>
-          <a:blip r:embed="rId4" cstate="print"/>
+          <a:blip r:embed="rId3" cstate="print"/>
           <a:srcRect/>
           <a:stretch>
             <a:fillRect/>
@@ -8059,7 +8009,7 @@
           <p:nvPr/>
         </p:nvPicPr>
         <p:blipFill>
-          <a:blip r:embed="rId5" cstate="print"/>
+          <a:blip r:embed="rId4" cstate="print"/>
           <a:srcRect/>
           <a:stretch>
             <a:fillRect/>
@@ -8094,7 +8044,7 @@
           <p:nvPr/>
         </p:nvPicPr>
         <p:blipFill>
-          <a:blip r:embed="rId6" cstate="print"/>
+          <a:blip r:embed="rId5" cstate="print"/>
           <a:srcRect/>
           <a:stretch>
             <a:fillRect/>

</xml_diff>

<commit_message>
XStudio Test management tool.pptx
</commit_message>
<xml_diff>
--- a/XStudio Test management tool.pptx
+++ b/XStudio Test management tool.pptx
@@ -115,7 +115,7 @@
   </p:defaultTextStyle>
   <p:extLst>
     <p:ext uri="{EFAFB233-063F-42B5-8137-9DF3F51BA10A}">
-      <p15:sldGuideLst xmlns="" xmlns:p15="http://schemas.microsoft.com/office/powerpoint/2012/main">
+      <p15:sldGuideLst xmlns:p15="http://schemas.microsoft.com/office/powerpoint/2012/main" xmlns="">
         <p15:guide id="1" orient="horz" pos="2160">
           <p15:clr>
             <a:srgbClr val="A4A3A4"/>
@@ -384,7 +384,7 @@
     </p:spTree>
     <p:extLst>
       <p:ext uri="{BB962C8B-B14F-4D97-AF65-F5344CB8AC3E}">
-        <p14:creationId xmlns="" xmlns:p14="http://schemas.microsoft.com/office/powerpoint/2010/main" val="844903877"/>
+        <p14:creationId xmlns:p14="http://schemas.microsoft.com/office/powerpoint/2010/main" xmlns="" val="844903877"/>
       </p:ext>
     </p:extLst>
   </p:cSld>
@@ -561,7 +561,7 @@
     </p:spTree>
     <p:extLst>
       <p:ext uri="{BB962C8B-B14F-4D97-AF65-F5344CB8AC3E}">
-        <p14:creationId xmlns="" xmlns:p14="http://schemas.microsoft.com/office/powerpoint/2010/main" val="1217469893"/>
+        <p14:creationId xmlns:p14="http://schemas.microsoft.com/office/powerpoint/2010/main" xmlns="" val="1217469893"/>
       </p:ext>
     </p:extLst>
   </p:cSld>
@@ -1248,7 +1248,7 @@
     </p:spTree>
     <p:extLst>
       <p:ext uri="{BB962C8B-B14F-4D97-AF65-F5344CB8AC3E}">
-        <p14:creationId xmlns="" xmlns:p14="http://schemas.microsoft.com/office/powerpoint/2010/main" val="2622159575"/>
+        <p14:creationId xmlns:p14="http://schemas.microsoft.com/office/powerpoint/2010/main" xmlns="" val="2622159575"/>
       </p:ext>
     </p:extLst>
   </p:cSld>
@@ -1553,7 +1553,7 @@
     </p:spTree>
     <p:extLst>
       <p:ext uri="{BB962C8B-B14F-4D97-AF65-F5344CB8AC3E}">
-        <p14:creationId xmlns="" xmlns:p14="http://schemas.microsoft.com/office/powerpoint/2010/main" val="2174042759"/>
+        <p14:creationId xmlns:p14="http://schemas.microsoft.com/office/powerpoint/2010/main" xmlns="" val="2174042759"/>
       </p:ext>
     </p:extLst>
   </p:cSld>
@@ -1984,7 +1984,7 @@
     </p:spTree>
     <p:extLst>
       <p:ext uri="{BB962C8B-B14F-4D97-AF65-F5344CB8AC3E}">
-        <p14:creationId xmlns="" xmlns:p14="http://schemas.microsoft.com/office/powerpoint/2010/main" val="3022439828"/>
+        <p14:creationId xmlns:p14="http://schemas.microsoft.com/office/powerpoint/2010/main" xmlns="" val="3022439828"/>
       </p:ext>
     </p:extLst>
   </p:cSld>
@@ -2151,7 +2151,7 @@
     </p:spTree>
     <p:extLst>
       <p:ext uri="{BB962C8B-B14F-4D97-AF65-F5344CB8AC3E}">
-        <p14:creationId xmlns="" xmlns:p14="http://schemas.microsoft.com/office/powerpoint/2010/main" val="3327602806"/>
+        <p14:creationId xmlns:p14="http://schemas.microsoft.com/office/powerpoint/2010/main" xmlns="" val="3327602806"/>
       </p:ext>
     </p:extLst>
   </p:cSld>
@@ -4806,7 +4806,7 @@
     </p:spTree>
     <p:extLst>
       <p:ext uri="{BB962C8B-B14F-4D97-AF65-F5344CB8AC3E}">
-        <p14:creationId xmlns="" xmlns:p14="http://schemas.microsoft.com/office/powerpoint/2010/main" val="2905724066"/>
+        <p14:creationId xmlns:p14="http://schemas.microsoft.com/office/powerpoint/2010/main" xmlns="" val="2905724066"/>
       </p:ext>
     </p:extLst>
   </p:cSld>
@@ -4969,7 +4969,7 @@
     </p:spTree>
     <p:extLst>
       <p:ext uri="{BB962C8B-B14F-4D97-AF65-F5344CB8AC3E}">
-        <p14:creationId xmlns="" xmlns:p14="http://schemas.microsoft.com/office/powerpoint/2010/main" val="3018226503"/>
+        <p14:creationId xmlns:p14="http://schemas.microsoft.com/office/powerpoint/2010/main" xmlns="" val="3018226503"/>
       </p:ext>
     </p:extLst>
   </p:cSld>
@@ -5397,7 +5397,7 @@
     </p:spTree>
     <p:extLst>
       <p:ext uri="{BB962C8B-B14F-4D97-AF65-F5344CB8AC3E}">
-        <p14:creationId xmlns="" xmlns:p14="http://schemas.microsoft.com/office/powerpoint/2010/main" val="3258216065"/>
+        <p14:creationId xmlns:p14="http://schemas.microsoft.com/office/powerpoint/2010/main" xmlns="" val="3258216065"/>
       </p:ext>
     </p:extLst>
   </p:cSld>
@@ -5451,7 +5451,7 @@
           <a:blip r:embed="rId9" cstate="print">
             <a:extLst>
               <a:ext uri="{28A0092B-C50C-407E-A947-70E740481C1C}">
-                <a14:useLocalDpi xmlns="" xmlns:a14="http://schemas.microsoft.com/office/drawing/2010/main"/>
+                <a14:useLocalDpi xmlns:a14="http://schemas.microsoft.com/office/drawing/2010/main" xmlns=""/>
               </a:ext>
             </a:extLst>
           </a:blip>
@@ -5471,7 +5471,7 @@
           <a:noFill/>
           <a:extLst>
             <a:ext uri="{909E8E84-426E-40DD-AFC4-6F175D3DCCD1}">
-              <a14:hiddenFill xmlns="" xmlns:a14="http://schemas.microsoft.com/office/drawing/2010/main">
+              <a14:hiddenFill xmlns:a14="http://schemas.microsoft.com/office/drawing/2010/main" xmlns="">
                 <a:solidFill>
                   <a:srgbClr val="FFFFFF"/>
                 </a:solidFill>
@@ -5492,7 +5492,7 @@
           <a:blip r:embed="rId10" cstate="email">
             <a:extLst>
               <a:ext uri="{28A0092B-C50C-407E-A947-70E740481C1C}">
-                <a14:useLocalDpi xmlns="" xmlns:a14="http://schemas.microsoft.com/office/drawing/2010/main"/>
+                <a14:useLocalDpi xmlns:a14="http://schemas.microsoft.com/office/drawing/2010/main" xmlns=""/>
               </a:ext>
             </a:extLst>
           </a:blip>
@@ -5516,14 +5516,14 @@
           <a:effectLst/>
           <a:extLst>
             <a:ext uri="{909E8E84-426E-40DD-AFC4-6F175D3DCCD1}">
-              <a14:hiddenFill xmlns="" xmlns:a14="http://schemas.microsoft.com/office/drawing/2010/main">
+              <a14:hiddenFill xmlns:a14="http://schemas.microsoft.com/office/drawing/2010/main" xmlns="">
                 <a:solidFill>
                   <a:schemeClr val="accent1"/>
                 </a:solidFill>
               </a14:hiddenFill>
             </a:ext>
             <a:ext uri="{91240B29-F687-4F45-9708-019B960494DF}">
-              <a14:hiddenLine xmlns="" xmlns:a14="http://schemas.microsoft.com/office/drawing/2010/main" w="9525">
+              <a14:hiddenLine xmlns:a14="http://schemas.microsoft.com/office/drawing/2010/main" xmlns="" w="9525">
                 <a:solidFill>
                   <a:schemeClr val="tx1"/>
                 </a:solidFill>
@@ -5533,7 +5533,7 @@
               </a14:hiddenLine>
             </a:ext>
             <a:ext uri="{AF507438-7753-43E0-B8FC-AC1667EBCBE1}">
-              <a14:hiddenEffects xmlns="" xmlns:a14="http://schemas.microsoft.com/office/drawing/2010/main">
+              <a14:hiddenEffects xmlns:a14="http://schemas.microsoft.com/office/drawing/2010/main" xmlns="">
                 <a:effectLst>
                   <a:outerShdw dist="35921" dir="2700000" algn="ctr" rotWithShape="0">
                     <a:schemeClr val="bg2"/>
@@ -5556,7 +5556,7 @@
           <a:blip r:embed="rId11" cstate="email">
             <a:extLst>
               <a:ext uri="{28A0092B-C50C-407E-A947-70E740481C1C}">
-                <a14:useLocalDpi xmlns="" xmlns:a14="http://schemas.microsoft.com/office/drawing/2010/main"/>
+                <a14:useLocalDpi xmlns:a14="http://schemas.microsoft.com/office/drawing/2010/main" xmlns=""/>
               </a:ext>
             </a:extLst>
           </a:blip>
@@ -5580,14 +5580,14 @@
           <a:effectLst/>
           <a:extLst>
             <a:ext uri="{909E8E84-426E-40DD-AFC4-6F175D3DCCD1}">
-              <a14:hiddenFill xmlns="" xmlns:a14="http://schemas.microsoft.com/office/drawing/2010/main">
+              <a14:hiddenFill xmlns:a14="http://schemas.microsoft.com/office/drawing/2010/main" xmlns="">
                 <a:solidFill>
                   <a:schemeClr val="accent1"/>
                 </a:solidFill>
               </a14:hiddenFill>
             </a:ext>
             <a:ext uri="{91240B29-F687-4F45-9708-019B960494DF}">
-              <a14:hiddenLine xmlns="" xmlns:a14="http://schemas.microsoft.com/office/drawing/2010/main" w="9525">
+              <a14:hiddenLine xmlns:a14="http://schemas.microsoft.com/office/drawing/2010/main" xmlns="" w="9525">
                 <a:solidFill>
                   <a:schemeClr val="tx1"/>
                 </a:solidFill>
@@ -5597,7 +5597,7 @@
               </a14:hiddenLine>
             </a:ext>
             <a:ext uri="{AF507438-7753-43E0-B8FC-AC1667EBCBE1}">
-              <a14:hiddenEffects xmlns="" xmlns:a14="http://schemas.microsoft.com/office/drawing/2010/main">
+              <a14:hiddenEffects xmlns:a14="http://schemas.microsoft.com/office/drawing/2010/main" xmlns="">
                 <a:effectLst>
                   <a:outerShdw dist="35921" dir="2700000" algn="ctr" rotWithShape="0">
                     <a:schemeClr val="bg2"/>
@@ -5620,7 +5620,7 @@
           <a:blip r:embed="rId12" cstate="print">
             <a:extLst>
               <a:ext uri="{BEBA8EAE-BF5A-486C-A8C5-ECC9F3942E4B}">
-                <a14:imgProps xmlns="" xmlns:a14="http://schemas.microsoft.com/office/drawing/2010/main">
+                <a14:imgProps xmlns:a14="http://schemas.microsoft.com/office/drawing/2010/main" xmlns="">
                   <a14:imgLayer r:embed="rId13">
                     <a14:imgEffect>
                       <a14:brightnessContrast bright="20000"/>
@@ -5629,7 +5629,7 @@
                 </a14:imgProps>
               </a:ext>
               <a:ext uri="{28A0092B-C50C-407E-A947-70E740481C1C}">
-                <a14:useLocalDpi xmlns="" xmlns:a14="http://schemas.microsoft.com/office/drawing/2010/main"/>
+                <a14:useLocalDpi xmlns:a14="http://schemas.microsoft.com/office/drawing/2010/main" xmlns=""/>
               </a:ext>
             </a:extLst>
           </a:blip>
@@ -5657,7 +5657,7 @@
           </a:effectLst>
           <a:extLst>
             <a:ext uri="{909E8E84-426E-40DD-AFC4-6F175D3DCCD1}">
-              <a14:hiddenFill xmlns="" xmlns:a14="http://schemas.microsoft.com/office/drawing/2010/main">
+              <a14:hiddenFill xmlns:a14="http://schemas.microsoft.com/office/drawing/2010/main" xmlns="">
                 <a:solidFill>
                   <a:srgbClr val="FFFFFF"/>
                 </a:solidFill>
@@ -5669,7 +5669,7 @@
     </p:spTree>
     <p:extLst>
       <p:ext uri="{BB962C8B-B14F-4D97-AF65-F5344CB8AC3E}">
-        <p14:creationId xmlns="" xmlns:p14="http://schemas.microsoft.com/office/powerpoint/2010/main" val="1157258628"/>
+        <p14:creationId xmlns:p14="http://schemas.microsoft.com/office/powerpoint/2010/main" xmlns="" val="1157258628"/>
       </p:ext>
     </p:extLst>
   </p:cSld>
@@ -6754,14 +6754,14 @@
           </a:effectLst>
           <a:extLst>
             <a:ext uri="{909E8E84-426E-40DD-AFC4-6F175D3DCCD1}">
-              <a14:hiddenFill xmlns="" xmlns:a14="http://schemas.microsoft.com/office/drawing/2010/main">
+              <a14:hiddenFill xmlns:a14="http://schemas.microsoft.com/office/drawing/2010/main" xmlns="">
                 <a:solidFill>
                   <a:schemeClr val="accent1"/>
                 </a:solidFill>
               </a14:hiddenFill>
             </a:ext>
             <a:ext uri="{91240B29-F687-4F45-9708-019B960494DF}">
-              <a14:hiddenLine xmlns="" xmlns:a14="http://schemas.microsoft.com/office/drawing/2010/main" w="9525">
+              <a14:hiddenLine xmlns:a14="http://schemas.microsoft.com/office/drawing/2010/main" xmlns="" w="9525">
                 <a:solidFill>
                   <a:schemeClr val="tx1"/>
                 </a:solidFill>
@@ -6812,14 +6812,14 @@
           </a:effectLst>
           <a:extLst>
             <a:ext uri="{909E8E84-426E-40DD-AFC4-6F175D3DCCD1}">
-              <a14:hiddenFill xmlns="" xmlns:a14="http://schemas.microsoft.com/office/drawing/2010/main">
+              <a14:hiddenFill xmlns:a14="http://schemas.microsoft.com/office/drawing/2010/main" xmlns="">
                 <a:solidFill>
                   <a:schemeClr val="accent1"/>
                 </a:solidFill>
               </a14:hiddenFill>
             </a:ext>
             <a:ext uri="{91240B29-F687-4F45-9708-019B960494DF}">
-              <a14:hiddenLine xmlns="" xmlns:a14="http://schemas.microsoft.com/office/drawing/2010/main" w="9525">
+              <a14:hiddenLine xmlns:a14="http://schemas.microsoft.com/office/drawing/2010/main" xmlns="" w="9525">
                 <a:solidFill>
                   <a:schemeClr val="tx1"/>
                 </a:solidFill>
@@ -7105,7 +7105,7 @@
     </p:spTree>
     <p:extLst>
       <p:ext uri="{BB962C8B-B14F-4D97-AF65-F5344CB8AC3E}">
-        <p14:creationId xmlns="" xmlns:p14="http://schemas.microsoft.com/office/powerpoint/2010/main" val="2909995806"/>
+        <p14:creationId xmlns:p14="http://schemas.microsoft.com/office/powerpoint/2010/main" xmlns="" val="2909995806"/>
       </p:ext>
     </p:extLst>
   </p:cSld>
@@ -7222,15 +7222,7 @@
             </a:r>
             <a:r>
               <a:rPr lang="en-GB" sz="2400" b="0" dirty="0" smtClean="0"/>
-              <a:t>) is free Application lifecycle management solution. It is 100% graphical and modular in design test management application that handles the complete lifecycle of QA/testing projects from end to end: users, requirements, specifications, </a:t>
-            </a:r>
-            <a:r>
-              <a:rPr lang="en-GB" sz="2400" b="0" dirty="0" smtClean="0"/>
-              <a:t>documents, </a:t>
-            </a:r>
-            <a:r>
-              <a:rPr lang="en-GB" sz="2400" b="0" dirty="0" smtClean="0"/>
-              <a:t>test plans, test reports, test case and bugs.  </a:t>
+              <a:t>) is free Application lifecycle management solution. It is 100% graphical and modular in design test management application that handles the complete lifecycle of QA/testing projects from end to end: users, requirements, specifications, documents, test plans, test reports, test case and bugs.  </a:t>
             </a:r>
             <a:endParaRPr lang="en-US" sz="2400" dirty="0" smtClean="0">
               <a:solidFill>
@@ -7313,7 +7305,7 @@
     </p:spTree>
     <p:extLst>
       <p:ext uri="{BB962C8B-B14F-4D97-AF65-F5344CB8AC3E}">
-        <p14:creationId xmlns="" xmlns:p14="http://schemas.microsoft.com/office/powerpoint/2010/main" val="3843481843"/>
+        <p14:creationId xmlns:p14="http://schemas.microsoft.com/office/powerpoint/2010/main" xmlns="" val="3843481843"/>
       </p:ext>
     </p:extLst>
   </p:cSld>
@@ -7321,7 +7313,7 @@
     <a:masterClrMapping/>
   </p:clrMapOvr>
   <mc:AlternateContent xmlns:mc="http://schemas.openxmlformats.org/markup-compatibility/2006">
-    <mc:Choice xmlns="" xmlns:p14="http://schemas.microsoft.com/office/powerpoint/2010/main" Requires="p14">
+    <mc:Choice xmlns:p14="http://schemas.microsoft.com/office/powerpoint/2010/main" xmlns="" Requires="p14">
       <p:transition spd="slow" p14:dur="2000"/>
     </mc:Choice>
     <mc:Fallback>
@@ -7419,8 +7411,8 @@
         </p:nvSpPr>
         <p:spPr>
           <a:xfrm>
-            <a:off x="443753" y="2648741"/>
-            <a:ext cx="8538881" cy="3785652"/>
+            <a:off x="315559" y="3200221"/>
+            <a:ext cx="8538881" cy="3170099"/>
           </a:xfrm>
           <a:prstGeom prst="rect">
             <a:avLst/>
@@ -7448,10 +7440,10 @@
                   </a:schemeClr>
                 </a:solidFill>
               </a:rPr>
-              <a:t>   Web access (through Java </a:t>
-            </a:r>
-            <a:r>
-              <a:rPr lang="en-GB" sz="2000" b="1" dirty="0" err="1" smtClean="0">
+              <a:t>   Document </a:t>
+            </a:r>
+            <a:r>
+              <a:rPr lang="en-GB" sz="2000" b="1" dirty="0" smtClean="0">
                 <a:solidFill>
                   <a:schemeClr val="tx1">
                     <a:lumMod val="40000"/>
@@ -7459,38 +7451,7 @@
                   </a:schemeClr>
                 </a:solidFill>
               </a:rPr>
-              <a:t>WebStart</a:t>
-            </a:r>
-            <a:r>
-              <a:rPr lang="en-GB" sz="2000" b="1" dirty="0" smtClean="0">
-                <a:solidFill>
-                  <a:schemeClr val="tx1">
-                    <a:lumMod val="40000"/>
-                    <a:lumOff val="60000"/>
-                  </a:schemeClr>
-                </a:solidFill>
-              </a:rPr>
-              <a:t>)</a:t>
-            </a:r>
-          </a:p>
-          <a:p>
-            <a:pPr>
-              <a:lnSpc>
-                <a:spcPct val="200000"/>
-              </a:lnSpc>
-              <a:buFont typeface="Wingdings" pitchFamily="2" charset="2"/>
-              <a:buChar char="Ø"/>
-            </a:pPr>
-            <a:r>
-              <a:rPr lang="en-GB" sz="2000" b="1" dirty="0" smtClean="0">
-                <a:solidFill>
-                  <a:schemeClr val="tx1">
-                    <a:lumMod val="40000"/>
-                    <a:lumOff val="60000"/>
-                  </a:schemeClr>
-                </a:solidFill>
-              </a:rPr>
-              <a:t>   Document sharing (including versioning and locking capabilities)</a:t>
+              <a:t>sharing (including versioning and locking capabilities)</a:t>
             </a:r>
           </a:p>
           <a:p>
@@ -7617,7 +7578,7 @@
     </p:spTree>
     <p:extLst>
       <p:ext uri="{BB962C8B-B14F-4D97-AF65-F5344CB8AC3E}">
-        <p14:creationId xmlns="" xmlns:p14="http://schemas.microsoft.com/office/powerpoint/2010/main" val="3425623869"/>
+        <p14:creationId xmlns:p14="http://schemas.microsoft.com/office/powerpoint/2010/main" xmlns="" val="3425623869"/>
       </p:ext>
     </p:extLst>
   </p:cSld>
@@ -7625,7 +7586,7 @@
     <a:masterClrMapping/>
   </p:clrMapOvr>
   <mc:AlternateContent xmlns:mc="http://schemas.openxmlformats.org/markup-compatibility/2006">
-    <mc:Choice xmlns="" xmlns:p14="http://schemas.microsoft.com/office/powerpoint/2010/main" Requires="p14">
+    <mc:Choice xmlns:p14="http://schemas.microsoft.com/office/powerpoint/2010/main" xmlns="" Requires="p14">
       <p:transition spd="slow" p14:dur="2000"/>
     </mc:Choice>
     <mc:Fallback>
@@ -7872,7 +7833,7 @@
     </p:spTree>
     <p:extLst>
       <p:ext uri="{BB962C8B-B14F-4D97-AF65-F5344CB8AC3E}">
-        <p14:creationId xmlns="" xmlns:p14="http://schemas.microsoft.com/office/powerpoint/2010/main" val="1586325312"/>
+        <p14:creationId xmlns:p14="http://schemas.microsoft.com/office/powerpoint/2010/main" xmlns="" val="1586325312"/>
       </p:ext>
     </p:extLst>
   </p:cSld>
@@ -7880,7 +7841,7 @@
     <a:masterClrMapping/>
   </p:clrMapOvr>
   <mc:AlternateContent xmlns:mc="http://schemas.openxmlformats.org/markup-compatibility/2006">
-    <mc:Choice xmlns="" xmlns:p14="http://schemas.microsoft.com/office/powerpoint/2010/main" Requires="p14">
+    <mc:Choice xmlns:p14="http://schemas.microsoft.com/office/powerpoint/2010/main" xmlns="" Requires="p14">
       <p:transition spd="slow" p14:dur="2000"/>
     </mc:Choice>
     <mc:Fallback>
@@ -8372,7 +8333,7 @@
     </p:spTree>
     <p:extLst>
       <p:ext uri="{BB962C8B-B14F-4D97-AF65-F5344CB8AC3E}">
-        <p14:creationId xmlns="" xmlns:p14="http://schemas.microsoft.com/office/powerpoint/2010/main" val="2254930528"/>
+        <p14:creationId xmlns:p14="http://schemas.microsoft.com/office/powerpoint/2010/main" xmlns="" val="2254930528"/>
       </p:ext>
     </p:extLst>
   </p:cSld>
@@ -8380,7 +8341,7 @@
     <a:masterClrMapping/>
   </p:clrMapOvr>
   <mc:AlternateContent xmlns:mc="http://schemas.openxmlformats.org/markup-compatibility/2006">
-    <mc:Choice xmlns="" xmlns:p14="http://schemas.microsoft.com/office/powerpoint/2010/main" Requires="p14">
+    <mc:Choice xmlns:p14="http://schemas.microsoft.com/office/powerpoint/2010/main" xmlns="" Requires="p14">
       <p:transition spd="slow" p14:dur="2000"/>
     </mc:Choice>
     <mc:Fallback>
@@ -8595,7 +8556,7 @@
     </p:spTree>
     <p:extLst>
       <p:ext uri="{BB962C8B-B14F-4D97-AF65-F5344CB8AC3E}">
-        <p14:creationId xmlns="" xmlns:p14="http://schemas.microsoft.com/office/powerpoint/2010/main" val="1103400583"/>
+        <p14:creationId xmlns:p14="http://schemas.microsoft.com/office/powerpoint/2010/main" xmlns="" val="1103400583"/>
       </p:ext>
     </p:extLst>
   </p:cSld>
@@ -8603,7 +8564,7 @@
     <a:masterClrMapping/>
   </p:clrMapOvr>
   <mc:AlternateContent xmlns:mc="http://schemas.openxmlformats.org/markup-compatibility/2006">
-    <mc:Choice xmlns="" xmlns:p14="http://schemas.microsoft.com/office/powerpoint/2010/main" Requires="p14">
+    <mc:Choice xmlns:p14="http://schemas.microsoft.com/office/powerpoint/2010/main" xmlns="" Requires="p14">
       <p:transition spd="slow" p14:dur="2000"/>
     </mc:Choice>
     <mc:Fallback>
@@ -9757,7 +9718,7 @@
   <a:extraClrSchemeLst/>
   <a:extLst>
     <a:ext uri="{05A4C25C-085E-4340-85A3-A5531E510DB2}">
-      <thm15:themeFamily xmlns="" xmlns:thm15="http://schemas.microsoft.com/office/thememl/2012/main" name="Telerik Academy Theme" id="{CC62B882-3A46-4F72-8436-1D7407ADFF02}" vid="{92E024D1-C2BF-4AF7-8ED1-5C666C82BD6D}"/>
+      <thm15:themeFamily xmlns:thm15="http://schemas.microsoft.com/office/thememl/2012/main" xmlns="" name="Telerik Academy Theme" id="{CC62B882-3A46-4F72-8436-1D7407ADFF02}" vid="{92E024D1-C2BF-4AF7-8ED1-5C666C82BD6D}"/>
     </a:ext>
   </a:extLst>
 </a:theme>
@@ -10018,7 +9979,7 @@
   <a:extraClrSchemeLst/>
   <a:extLst>
     <a:ext uri="{05A4C25C-085E-4340-85A3-A5531E510DB2}">
-      <thm15:themeFamily xmlns="" xmlns:thm15="http://schemas.microsoft.com/office/thememl/2012/main" name="Office Theme" id="{62F939B6-93AF-4DB8-9C6B-D6C7DFDC589F}" vid="{4A3C46E8-61CC-4603-A589-7422A47A8E4A}"/>
+      <thm15:themeFamily xmlns:thm15="http://schemas.microsoft.com/office/thememl/2012/main" xmlns="" name="Office Theme" id="{62F939B6-93AF-4DB8-9C6B-D6C7DFDC589F}" vid="{4A3C46E8-61CC-4603-A589-7422A47A8E4A}"/>
     </a:ext>
   </a:extLst>
 </a:theme>

</xml_diff>